<commit_message>
Actualización PPT + Código
</commit_message>
<xml_diff>
--- a/DesigningTestableApplications.pptx
+++ b/DesigningTestableApplications.pptx
@@ -251,7 +251,7 @@
           <a:p>
             <a:fld id="{D63D5444-F62C-42C3-A75A-D9DBA807730F}" type="datetimeFigureOut">
               <a:rPr lang="en-US" smtClean="0"/>
-              <a:t>3/19/2015</a:t>
+              <a:t>4/17/2015</a:t>
             </a:fld>
             <a:endParaRPr lang="en-US"/>
           </a:p>
@@ -416,7 +416,7 @@
           <a:p>
             <a:fld id="{12CAA1FA-7B6A-47D2-8D61-F225D71B51FF}" type="datetimeFigureOut">
               <a:rPr lang="en-US" smtClean="0"/>
-              <a:t>3/19/2015</a:t>
+              <a:t>4/17/2015</a:t>
             </a:fld>
             <a:endParaRPr lang="en-US"/>
           </a:p>
@@ -17203,8 +17203,39 @@
               <a:rPr lang="en-GB" dirty="0">
                 <a:latin typeface="Avenir 45 Book (Body)"/>
               </a:rPr>
-              <a:t> third-party dependencies</a:t>
-            </a:r>
+              <a:t> third-party </a:t>
+            </a:r>
+            <a:r>
+              <a:rPr lang="en-GB" dirty="0" smtClean="0">
+                <a:latin typeface="Avenir 45 Book (Body)"/>
+              </a:rPr>
+              <a:t>dependencies</a:t>
+            </a:r>
+          </a:p>
+          <a:p>
+            <a:pPr marL="0" lvl="1" indent="0">
+              <a:spcBef>
+                <a:spcPts val="1200"/>
+              </a:spcBef>
+              <a:buClrTx/>
+              <a:buFont typeface="Wingdings" panose="05000000000000000000" pitchFamily="2" charset="2"/>
+              <a:buChar char="§"/>
+            </a:pPr>
+            <a:r>
+              <a:rPr lang="en-GB" dirty="0">
+                <a:latin typeface="Avenir 45 Book (Body)"/>
+              </a:rPr>
+              <a:t> </a:t>
+            </a:r>
+            <a:r>
+              <a:rPr lang="en-GB" dirty="0" smtClean="0">
+                <a:latin typeface="Avenir 45 Book (Body)"/>
+              </a:rPr>
+              <a:t>Avoids the use of specific third-party library’s classes in your code</a:t>
+            </a:r>
+            <a:endParaRPr lang="en-GB" dirty="0">
+              <a:latin typeface="Avenir 45 Book (Body)"/>
+            </a:endParaRPr>
           </a:p>
           <a:p>
             <a:pPr marL="0" lvl="1" indent="0">
@@ -24375,9 +24406,6 @@
               </a:rPr>
               <a:t>:</a:t>
             </a:r>
-            <a:endParaRPr lang="en-GB" dirty="0" smtClean="0">
-              <a:latin typeface="Avenir 45 Book (Body)"/>
-            </a:endParaRPr>
           </a:p>
           <a:p>
             <a:pPr marL="0" lvl="1" indent="0">

</xml_diff>